<commit_message>
fixed several fuzzy suppl figures
</commit_message>
<xml_diff>
--- a/supplementary_figures/overview_src/src/challenge-submission.pptx
+++ b/supplementary_figures/overview_src/src/challenge-submission.pptx
@@ -208,7 +208,7 @@
           <a:p>
             <a:fld id="{15A0C02E-9ECF-DF42-9DD1-1F4331EA6F0F}" type="datetimeFigureOut">
               <a:rPr lang="en-US" smtClean="0"/>
-              <a:t>12/24/23</a:t>
+              <a:t>1/4/24</a:t>
             </a:fld>
             <a:endParaRPr lang="en-US"/>
           </a:p>
@@ -606,7 +606,7 @@
           <a:p>
             <a:fld id="{A6D843C9-D8A9-B84E-97C0-11A4907B9044}" type="datetimeFigureOut">
               <a:rPr lang="en-US" smtClean="0"/>
-              <a:t>12/24/23</a:t>
+              <a:t>1/4/24</a:t>
             </a:fld>
             <a:endParaRPr lang="en-US"/>
           </a:p>
@@ -776,7 +776,7 @@
           <a:p>
             <a:fld id="{A6D843C9-D8A9-B84E-97C0-11A4907B9044}" type="datetimeFigureOut">
               <a:rPr lang="en-US" smtClean="0"/>
-              <a:t>12/24/23</a:t>
+              <a:t>1/4/24</a:t>
             </a:fld>
             <a:endParaRPr lang="en-US"/>
           </a:p>
@@ -956,7 +956,7 @@
           <a:p>
             <a:fld id="{A6D843C9-D8A9-B84E-97C0-11A4907B9044}" type="datetimeFigureOut">
               <a:rPr lang="en-US" smtClean="0"/>
-              <a:t>12/24/23</a:t>
+              <a:t>1/4/24</a:t>
             </a:fld>
             <a:endParaRPr lang="en-US"/>
           </a:p>
@@ -1126,7 +1126,7 @@
           <a:p>
             <a:fld id="{A6D843C9-D8A9-B84E-97C0-11A4907B9044}" type="datetimeFigureOut">
               <a:rPr lang="en-US" smtClean="0"/>
-              <a:t>12/24/23</a:t>
+              <a:t>1/4/24</a:t>
             </a:fld>
             <a:endParaRPr lang="en-US"/>
           </a:p>
@@ -1370,7 +1370,7 @@
           <a:p>
             <a:fld id="{A6D843C9-D8A9-B84E-97C0-11A4907B9044}" type="datetimeFigureOut">
               <a:rPr lang="en-US" smtClean="0"/>
-              <a:t>12/24/23</a:t>
+              <a:t>1/4/24</a:t>
             </a:fld>
             <a:endParaRPr lang="en-US"/>
           </a:p>
@@ -1602,7 +1602,7 @@
           <a:p>
             <a:fld id="{A6D843C9-D8A9-B84E-97C0-11A4907B9044}" type="datetimeFigureOut">
               <a:rPr lang="en-US" smtClean="0"/>
-              <a:t>12/24/23</a:t>
+              <a:t>1/4/24</a:t>
             </a:fld>
             <a:endParaRPr lang="en-US"/>
           </a:p>
@@ -1969,7 +1969,7 @@
           <a:p>
             <a:fld id="{A6D843C9-D8A9-B84E-97C0-11A4907B9044}" type="datetimeFigureOut">
               <a:rPr lang="en-US" smtClean="0"/>
-              <a:t>12/24/23</a:t>
+              <a:t>1/4/24</a:t>
             </a:fld>
             <a:endParaRPr lang="en-US"/>
           </a:p>
@@ -2087,7 +2087,7 @@
           <a:p>
             <a:fld id="{A6D843C9-D8A9-B84E-97C0-11A4907B9044}" type="datetimeFigureOut">
               <a:rPr lang="en-US" smtClean="0"/>
-              <a:t>12/24/23</a:t>
+              <a:t>1/4/24</a:t>
             </a:fld>
             <a:endParaRPr lang="en-US"/>
           </a:p>
@@ -2182,7 +2182,7 @@
           <a:p>
             <a:fld id="{A6D843C9-D8A9-B84E-97C0-11A4907B9044}" type="datetimeFigureOut">
               <a:rPr lang="en-US" smtClean="0"/>
-              <a:t>12/24/23</a:t>
+              <a:t>1/4/24</a:t>
             </a:fld>
             <a:endParaRPr lang="en-US"/>
           </a:p>
@@ -2459,7 +2459,7 @@
           <a:p>
             <a:fld id="{A6D843C9-D8A9-B84E-97C0-11A4907B9044}" type="datetimeFigureOut">
               <a:rPr lang="en-US" smtClean="0"/>
-              <a:t>12/24/23</a:t>
+              <a:t>1/4/24</a:t>
             </a:fld>
             <a:endParaRPr lang="en-US"/>
           </a:p>
@@ -2716,7 +2716,7 @@
           <a:p>
             <a:fld id="{A6D843C9-D8A9-B84E-97C0-11A4907B9044}" type="datetimeFigureOut">
               <a:rPr lang="en-US" smtClean="0"/>
-              <a:t>12/24/23</a:t>
+              <a:t>1/4/24</a:t>
             </a:fld>
             <a:endParaRPr lang="en-US"/>
           </a:p>
@@ -2929,7 +2929,7 @@
           <a:p>
             <a:fld id="{A6D843C9-D8A9-B84E-97C0-11A4907B9044}" type="datetimeFigureOut">
               <a:rPr lang="en-US" smtClean="0"/>
-              <a:t>12/24/23</a:t>
+              <a:t>1/4/24</a:t>
             </a:fld>
             <a:endParaRPr lang="en-US"/>
           </a:p>
@@ -3334,12 +3334,82 @@
           <a:chExt cx="0" cy="0"/>
         </a:xfrm>
       </p:grpSpPr>
+      <p:sp>
+        <p:nvSpPr>
+          <p:cNvPr id="6" name="TextBox 5">
+            <a:extLst>
+              <a:ext uri="{FF2B5EF4-FFF2-40B4-BE49-F238E27FC236}">
+                <a16:creationId xmlns:a16="http://schemas.microsoft.com/office/drawing/2014/main" id="{DFD874DC-44FF-B9E5-9B5D-5302F2A606F4}"/>
+              </a:ext>
+            </a:extLst>
+          </p:cNvPr>
+          <p:cNvSpPr txBox="1"/>
+          <p:nvPr/>
+        </p:nvSpPr>
+        <p:spPr>
+          <a:xfrm>
+            <a:off x="154224" y="281354"/>
+            <a:ext cx="45719" cy="369332"/>
+          </a:xfrm>
+          <a:prstGeom prst="rect">
+            <a:avLst/>
+          </a:prstGeom>
+          <a:noFill/>
+        </p:spPr>
+        <p:txBody>
+          <a:bodyPr wrap="square" rtlCol="0">
+            <a:spAutoFit/>
+          </a:bodyPr>
+          <a:lstStyle/>
+          <a:p>
+            <a:r>
+              <a:rPr lang="en-US" dirty="0"/>
+              <a:t>a</a:t>
+            </a:r>
+          </a:p>
+        </p:txBody>
+      </p:sp>
+      <p:sp>
+        <p:nvSpPr>
+          <p:cNvPr id="7" name="TextBox 6">
+            <a:extLst>
+              <a:ext uri="{FF2B5EF4-FFF2-40B4-BE49-F238E27FC236}">
+                <a16:creationId xmlns:a16="http://schemas.microsoft.com/office/drawing/2014/main" id="{DFD173B8-3CE3-980E-D909-7A270E9220CE}"/>
+              </a:ext>
+            </a:extLst>
+          </p:cNvPr>
+          <p:cNvSpPr txBox="1"/>
+          <p:nvPr/>
+        </p:nvSpPr>
+        <p:spPr>
+          <a:xfrm>
+            <a:off x="6512" y="4188601"/>
+            <a:ext cx="306494" cy="369332"/>
+          </a:xfrm>
+          <a:prstGeom prst="rect">
+            <a:avLst/>
+          </a:prstGeom>
+          <a:noFill/>
+        </p:spPr>
+        <p:txBody>
+          <a:bodyPr wrap="none" rtlCol="0">
+            <a:spAutoFit/>
+          </a:bodyPr>
+          <a:lstStyle/>
+          <a:p>
+            <a:r>
+              <a:rPr lang="en-US" dirty="0"/>
+              <a:t>b</a:t>
+            </a:r>
+          </a:p>
+        </p:txBody>
+      </p:sp>
       <p:pic>
         <p:nvPicPr>
-          <p:cNvPr id="3" name="Picture 2" descr="A diagram of a software development process&#10;&#10;Description automatically generated">
+          <p:cNvPr id="4" name="Picture 3">
             <a:extLst>
               <a:ext uri="{FF2B5EF4-FFF2-40B4-BE49-F238E27FC236}">
-                <a16:creationId xmlns:a16="http://schemas.microsoft.com/office/drawing/2014/main" id="{87267EC0-6FD0-B8F9-8326-974AF15C03F0}"/>
+                <a16:creationId xmlns:a16="http://schemas.microsoft.com/office/drawing/2014/main" id="{BD5D8410-39DA-F991-8A5F-60F594578806}"/>
               </a:ext>
             </a:extLst>
           </p:cNvPr>
@@ -3356,8 +3426,8 @@
         </p:blipFill>
         <p:spPr>
           <a:xfrm>
-            <a:off x="313006" y="423071"/>
-            <a:ext cx="6231988" cy="3088364"/>
+            <a:off x="457200" y="4281249"/>
+            <a:ext cx="5943600" cy="3343275"/>
           </a:xfrm>
           <a:prstGeom prst="rect">
             <a:avLst/>
@@ -3366,10 +3436,10 @@
       </p:pic>
       <p:pic>
         <p:nvPicPr>
-          <p:cNvPr id="5" name="Picture 4" descr="A diagram of a sample&#10;&#10;Description automatically generated">
+          <p:cNvPr id="9" name="Picture 8">
             <a:extLst>
               <a:ext uri="{FF2B5EF4-FFF2-40B4-BE49-F238E27FC236}">
-                <a16:creationId xmlns:a16="http://schemas.microsoft.com/office/drawing/2014/main" id="{AB302C16-5EC7-C0D6-6F46-5AB32B4ED8E3}"/>
+                <a16:creationId xmlns:a16="http://schemas.microsoft.com/office/drawing/2014/main" id="{85FE53F7-6EA9-0354-3215-4AFDD6D50EEB}"/>
               </a:ext>
             </a:extLst>
           </p:cNvPr>
@@ -3386,84 +3456,14 @@
         </p:blipFill>
         <p:spPr>
           <a:xfrm>
-            <a:off x="313006" y="4372670"/>
-            <a:ext cx="6231988" cy="3472836"/>
+            <a:off x="515396" y="360823"/>
+            <a:ext cx="5943600" cy="3343275"/>
           </a:xfrm>
           <a:prstGeom prst="rect">
             <a:avLst/>
           </a:prstGeom>
         </p:spPr>
       </p:pic>
-      <p:sp>
-        <p:nvSpPr>
-          <p:cNvPr id="6" name="TextBox 5">
-            <a:extLst>
-              <a:ext uri="{FF2B5EF4-FFF2-40B4-BE49-F238E27FC236}">
-                <a16:creationId xmlns:a16="http://schemas.microsoft.com/office/drawing/2014/main" id="{DFD874DC-44FF-B9E5-9B5D-5302F2A606F4}"/>
-              </a:ext>
-            </a:extLst>
-          </p:cNvPr>
-          <p:cNvSpPr txBox="1"/>
-          <p:nvPr/>
-        </p:nvSpPr>
-        <p:spPr>
-          <a:xfrm>
-            <a:off x="154224" y="281354"/>
-            <a:ext cx="45719" cy="369332"/>
-          </a:xfrm>
-          <a:prstGeom prst="rect">
-            <a:avLst/>
-          </a:prstGeom>
-          <a:noFill/>
-        </p:spPr>
-        <p:txBody>
-          <a:bodyPr wrap="square" rtlCol="0">
-            <a:spAutoFit/>
-          </a:bodyPr>
-          <a:lstStyle/>
-          <a:p>
-            <a:r>
-              <a:rPr lang="en-US" dirty="0"/>
-              <a:t>a</a:t>
-            </a:r>
-          </a:p>
-        </p:txBody>
-      </p:sp>
-      <p:sp>
-        <p:nvSpPr>
-          <p:cNvPr id="7" name="TextBox 6">
-            <a:extLst>
-              <a:ext uri="{FF2B5EF4-FFF2-40B4-BE49-F238E27FC236}">
-                <a16:creationId xmlns:a16="http://schemas.microsoft.com/office/drawing/2014/main" id="{DFD173B8-3CE3-980E-D909-7A270E9220CE}"/>
-              </a:ext>
-            </a:extLst>
-          </p:cNvPr>
-          <p:cNvSpPr txBox="1"/>
-          <p:nvPr/>
-        </p:nvSpPr>
-        <p:spPr>
-          <a:xfrm>
-            <a:off x="6512" y="4188601"/>
-            <a:ext cx="306494" cy="369332"/>
-          </a:xfrm>
-          <a:prstGeom prst="rect">
-            <a:avLst/>
-          </a:prstGeom>
-          <a:noFill/>
-        </p:spPr>
-        <p:txBody>
-          <a:bodyPr wrap="none" rtlCol="0">
-            <a:spAutoFit/>
-          </a:bodyPr>
-          <a:lstStyle/>
-          <a:p>
-            <a:r>
-              <a:rPr lang="en-US" dirty="0"/>
-              <a:t>b</a:t>
-            </a:r>
-          </a:p>
-        </p:txBody>
-      </p:sp>
     </p:spTree>
     <p:extLst>
       <p:ext uri="{BB962C8B-B14F-4D97-AF65-F5344CB8AC3E}">

</xml_diff>